<commit_message>
modified slide talking about python 2 to just say USE PYTHON 3
</commit_message>
<xml_diff>
--- a/python/presentations/learning_python/01_ceda-intro.pptx
+++ b/python/presentations/learning_python/01_ceda-intro.pptx
@@ -378,7 +378,7 @@
           </a:lstStyle>
           <a:p>
             <a:r>
-              <a:rPr lang="en-US" smtClean="0"/>
+              <a:rPr lang="en-US"/>
               <a:t>Click to edit Master title style</a:t>
             </a:r>
             <a:endParaRPr lang="en-US" dirty="0"/>
@@ -454,7 +454,7 @@
           </a:lstStyle>
           <a:p>
             <a:r>
-              <a:rPr lang="en-US" smtClean="0"/>
+              <a:rPr lang="en-US"/>
               <a:t>Click to edit Master subtitle style</a:t>
             </a:r>
             <a:endParaRPr lang="en-US" dirty="0"/>
@@ -523,7 +523,7 @@
           </a:lstStyle>
           <a:p>
             <a:r>
-              <a:rPr lang="en-US" smtClean="0"/>
+              <a:rPr lang="en-US"/>
               <a:t>Click to edit Master title style</a:t>
             </a:r>
             <a:endParaRPr lang="en-US" dirty="0"/>
@@ -597,7 +597,7 @@
           </a:lstStyle>
           <a:p>
             <a:r>
-              <a:rPr lang="en-US" smtClean="0"/>
+              <a:rPr lang="en-US"/>
               <a:t>Click to edit Master subtitle style</a:t>
             </a:r>
             <a:endParaRPr lang="en-US" dirty="0"/>
@@ -644,7 +644,7 @@
           <a:p>
             <a:pPr lvl="0"/>
             <a:r>
-              <a:rPr lang="en-US" noProof="0" smtClean="0"/>
+              <a:rPr lang="en-US" noProof="0"/>
               <a:t>Click icon to add picture</a:t>
             </a:r>
             <a:endParaRPr lang="en-GB" noProof="0" dirty="0"/>
@@ -692,7 +692,7 @@
               <a:pPr>
                 <a:defRPr/>
               </a:pPr>
-              <a:t>19/11/2019</a:t>
+              <a:t>15/10/2021</a:t>
             </a:fld>
             <a:endParaRPr lang="en-GB"/>
           </a:p>
@@ -760,7 +760,7 @@
           </a:lstStyle>
           <a:p>
             <a:r>
-              <a:rPr lang="en-US" smtClean="0"/>
+              <a:rPr lang="en-US"/>
               <a:t>Click to edit Master title style</a:t>
             </a:r>
             <a:endParaRPr lang="en-US" dirty="0"/>
@@ -834,7 +834,7 @@
           </a:lstStyle>
           <a:p>
             <a:r>
-              <a:rPr lang="en-US" smtClean="0"/>
+              <a:rPr lang="en-US"/>
               <a:t>Click to edit Master subtitle style</a:t>
             </a:r>
             <a:endParaRPr lang="en-US" dirty="0"/>
@@ -881,7 +881,7 @@
           <a:p>
             <a:pPr lvl="0"/>
             <a:r>
-              <a:rPr lang="en-US" noProof="0" smtClean="0"/>
+              <a:rPr lang="en-US" noProof="0"/>
               <a:t>Click icon to add picture</a:t>
             </a:r>
             <a:endParaRPr lang="en-GB" noProof="0" dirty="0"/>
@@ -929,7 +929,7 @@
               <a:pPr>
                 <a:defRPr/>
               </a:pPr>
-              <a:t>19/11/2019</a:t>
+              <a:t>15/10/2021</a:t>
             </a:fld>
             <a:endParaRPr lang="en-GB"/>
           </a:p>
@@ -1032,7 +1032,7 @@
           </a:lstStyle>
           <a:p>
             <a:r>
-              <a:rPr lang="en-US" smtClean="0"/>
+              <a:rPr lang="en-US"/>
               <a:t>Click to edit Master title style</a:t>
             </a:r>
             <a:endParaRPr lang="en-US" dirty="0"/>
@@ -1079,7 +1079,7 @@
           <a:p>
             <a:pPr lvl="0"/>
             <a:r>
-              <a:rPr lang="en-US" noProof="0" smtClean="0"/>
+              <a:rPr lang="en-US" noProof="0"/>
               <a:t>Click icon to add picture</a:t>
             </a:r>
             <a:endParaRPr lang="en-GB" noProof="0" dirty="0"/>
@@ -1135,35 +1135,35 @@
           <a:p>
             <a:pPr lvl="0"/>
             <a:r>
-              <a:rPr lang="en-US" smtClean="0"/>
+              <a:rPr lang="en-US"/>
               <a:t>Edit Master text styles</a:t>
             </a:r>
           </a:p>
           <a:p>
             <a:pPr lvl="1"/>
             <a:r>
-              <a:rPr lang="en-US" smtClean="0"/>
+              <a:rPr lang="en-US"/>
               <a:t>Second level</a:t>
             </a:r>
           </a:p>
           <a:p>
             <a:pPr lvl="2"/>
             <a:r>
-              <a:rPr lang="en-US" smtClean="0"/>
+              <a:rPr lang="en-US"/>
               <a:t>Third level</a:t>
             </a:r>
           </a:p>
           <a:p>
             <a:pPr lvl="3"/>
             <a:r>
-              <a:rPr lang="en-US" smtClean="0"/>
+              <a:rPr lang="en-US"/>
               <a:t>Fourth level</a:t>
             </a:r>
           </a:p>
           <a:p>
             <a:pPr lvl="4"/>
             <a:r>
-              <a:rPr lang="en-US" smtClean="0"/>
+              <a:rPr lang="en-US"/>
               <a:t>Fifth level</a:t>
             </a:r>
             <a:endParaRPr lang="en-US" dirty="0"/>
@@ -1267,7 +1267,7 @@
           </a:lstStyle>
           <a:p>
             <a:r>
-              <a:rPr lang="en-US" smtClean="0"/>
+              <a:rPr lang="en-US"/>
               <a:t>Click to edit Master title style</a:t>
             </a:r>
             <a:endParaRPr lang="en-US" dirty="0"/>
@@ -1323,35 +1323,35 @@
           <a:p>
             <a:pPr lvl="0"/>
             <a:r>
-              <a:rPr lang="en-US" smtClean="0"/>
+              <a:rPr lang="en-US"/>
               <a:t>Edit Master text styles</a:t>
             </a:r>
           </a:p>
           <a:p>
             <a:pPr lvl="1"/>
             <a:r>
-              <a:rPr lang="en-US" smtClean="0"/>
+              <a:rPr lang="en-US"/>
               <a:t>Second level</a:t>
             </a:r>
           </a:p>
           <a:p>
             <a:pPr lvl="2"/>
             <a:r>
-              <a:rPr lang="en-US" smtClean="0"/>
+              <a:rPr lang="en-US"/>
               <a:t>Third level</a:t>
             </a:r>
           </a:p>
           <a:p>
             <a:pPr lvl="3"/>
             <a:r>
-              <a:rPr lang="en-US" smtClean="0"/>
+              <a:rPr lang="en-US"/>
               <a:t>Fourth level</a:t>
             </a:r>
           </a:p>
           <a:p>
             <a:pPr lvl="4"/>
             <a:r>
-              <a:rPr lang="en-US" smtClean="0"/>
+              <a:rPr lang="en-US"/>
               <a:t>Fifth level</a:t>
             </a:r>
             <a:endParaRPr lang="en-US" dirty="0"/>
@@ -1432,7 +1432,7 @@
           </a:lstStyle>
           <a:p>
             <a:r>
-              <a:rPr lang="en-US" smtClean="0"/>
+              <a:rPr lang="en-US"/>
               <a:t>Click to edit Master title style</a:t>
             </a:r>
             <a:endParaRPr lang="en-US" dirty="0"/>
@@ -1506,7 +1506,7 @@
           </a:lstStyle>
           <a:p>
             <a:r>
-              <a:rPr lang="en-US" smtClean="0"/>
+              <a:rPr lang="en-US"/>
               <a:t>Click to edit Master subtitle style</a:t>
             </a:r>
             <a:endParaRPr lang="en-US" dirty="0"/>
@@ -1559,7 +1559,7 @@
           <a:lstStyle/>
           <a:p>
             <a:r>
-              <a:rPr lang="en-US" smtClean="0"/>
+              <a:rPr lang="en-US"/>
               <a:t>Click to edit Master title style</a:t>
             </a:r>
             <a:endParaRPr lang="en-GB"/>
@@ -1583,35 +1583,35 @@
           <a:p>
             <a:pPr lvl="0"/>
             <a:r>
-              <a:rPr lang="en-US" smtClean="0"/>
+              <a:rPr lang="en-US"/>
               <a:t>Click to edit Master text styles</a:t>
             </a:r>
           </a:p>
           <a:p>
             <a:pPr lvl="1"/>
             <a:r>
-              <a:rPr lang="en-US" smtClean="0"/>
+              <a:rPr lang="en-US"/>
               <a:t>Second level</a:t>
             </a:r>
           </a:p>
           <a:p>
             <a:pPr lvl="2"/>
             <a:r>
-              <a:rPr lang="en-US" smtClean="0"/>
+              <a:rPr lang="en-US"/>
               <a:t>Third level</a:t>
             </a:r>
           </a:p>
           <a:p>
             <a:pPr lvl="3"/>
             <a:r>
-              <a:rPr lang="en-US" smtClean="0"/>
+              <a:rPr lang="en-US"/>
               <a:t>Fourth level</a:t>
             </a:r>
           </a:p>
           <a:p>
             <a:pPr lvl="4"/>
             <a:r>
-              <a:rPr lang="en-US" smtClean="0"/>
+              <a:rPr lang="en-US"/>
               <a:t>Fifth level</a:t>
             </a:r>
             <a:endParaRPr lang="en-GB"/>
@@ -1650,7 +1650,7 @@
               <a:pPr>
                 <a:defRPr/>
               </a:pPr>
-              <a:t>19/11/2019</a:t>
+              <a:t>15/10/2021</a:t>
             </a:fld>
             <a:endParaRPr lang="en-GB"/>
           </a:p>
@@ -1981,35 +1981,35 @@
           <a:p>
             <a:pPr lvl="0"/>
             <a:r>
-              <a:rPr lang="en-US" altLang="en-US" smtClean="0"/>
+              <a:rPr lang="en-US" altLang="en-US"/>
               <a:t>Edit Master text styles</a:t>
             </a:r>
           </a:p>
           <a:p>
             <a:pPr lvl="1"/>
             <a:r>
-              <a:rPr lang="en-US" altLang="en-US" smtClean="0"/>
+              <a:rPr lang="en-US" altLang="en-US"/>
               <a:t>Second level</a:t>
             </a:r>
           </a:p>
           <a:p>
             <a:pPr lvl="2"/>
             <a:r>
-              <a:rPr lang="en-US" altLang="en-US" smtClean="0"/>
+              <a:rPr lang="en-US" altLang="en-US"/>
               <a:t>Third level</a:t>
             </a:r>
           </a:p>
           <a:p>
             <a:pPr lvl="3"/>
             <a:r>
-              <a:rPr lang="en-US" altLang="en-US" smtClean="0"/>
+              <a:rPr lang="en-US" altLang="en-US"/>
               <a:t>Fourth level</a:t>
             </a:r>
           </a:p>
           <a:p>
             <a:pPr lvl="4"/>
             <a:r>
-              <a:rPr lang="en-US" altLang="en-US" smtClean="0"/>
+              <a:rPr lang="en-US" altLang="en-US"/>
               <a:t>Fifth level</a:t>
             </a:r>
           </a:p>
@@ -2223,10 +2223,10 @@
           <a:p>
             <a:pPr lvl="0"/>
             <a:r>
-              <a:rPr lang="en-US" altLang="en-US" smtClean="0"/>
+              <a:rPr lang="en-US" altLang="en-US"/>
               <a:t>Click to edit Master title style</a:t>
             </a:r>
-            <a:endParaRPr lang="en-GB" altLang="en-US" smtClean="0"/>
+            <a:endParaRPr lang="en-GB" altLang="en-US"/>
           </a:p>
         </p:txBody>
       </p:sp>
@@ -2724,7 +2724,7 @@
           <a:lstStyle/>
           <a:p>
             <a:r>
-              <a:rPr lang="en-GB" altLang="en-US" sz="4000" smtClean="0"/>
+              <a:rPr lang="en-GB" altLang="en-US" sz="4000"/>
               <a:t>Python introductions</a:t>
             </a:r>
           </a:p>
@@ -2753,7 +2753,7 @@
           <a:lstStyle/>
           <a:p>
             <a:r>
-              <a:rPr lang="en-GB" altLang="en-US" sz="1400" dirty="0" smtClean="0">
+              <a:rPr lang="en-GB" altLang="en-US" sz="1400" dirty="0">
                 <a:solidFill>
                   <a:srgbClr val="002060"/>
                 </a:solidFill>
@@ -2762,7 +2762,7 @@
             </a:r>
           </a:p>
           <a:p>
-            <a:endParaRPr lang="en-GB" altLang="en-US" sz="700" dirty="0" smtClean="0">
+            <a:endParaRPr lang="en-GB" altLang="en-US" sz="700" dirty="0">
               <a:solidFill>
                 <a:srgbClr val="002060"/>
               </a:solidFill>
@@ -2770,23 +2770,23 @@
           </a:p>
           <a:p>
             <a:r>
-              <a:rPr lang="en-GB" altLang="en-US" sz="1400" dirty="0" smtClean="0"/>
+              <a:rPr lang="en-GB" altLang="en-US" sz="1400" dirty="0"/>
               <a:t>Alison </a:t>
             </a:r>
             <a:r>
-              <a:rPr lang="en-GB" altLang="en-US" sz="1400" dirty="0" err="1" smtClean="0"/>
+              <a:rPr lang="en-GB" altLang="en-US" sz="1400" dirty="0" err="1"/>
               <a:t>Pamment</a:t>
             </a:r>
             <a:r>
-              <a:rPr lang="en-GB" altLang="en-US" sz="1400" dirty="0" smtClean="0"/>
+              <a:rPr lang="en-GB" altLang="en-US" sz="1400" dirty="0"/>
               <a:t>, Sam </a:t>
             </a:r>
             <a:r>
-              <a:rPr lang="en-GB" altLang="en-US" sz="1400" dirty="0" err="1" smtClean="0"/>
+              <a:rPr lang="en-GB" altLang="en-US" sz="1400" dirty="0" err="1"/>
               <a:t>Pepler</a:t>
             </a:r>
             <a:r>
-              <a:rPr lang="en-GB" altLang="en-US" sz="1400" dirty="0" smtClean="0"/>
+              <a:rPr lang="en-GB" altLang="en-US" sz="1400" dirty="0"/>
               <a:t>, Ag Stephens, Stephen Pascoe, Matt Pryor,  Anabelle Guillory, Graham Parton, Esther Conway, Wendy Garland, Alan Iwi, Matt Pritchard and Tommy Godfrey.</a:t>
             </a:r>
           </a:p>
@@ -2797,13 +2797,6 @@
   <p:clrMapOvr>
     <a:masterClrMapping/>
   </p:clrMapOvr>
-  <p:timing>
-    <p:tnLst>
-      <p:par>
-        <p:cTn id="1" dur="indefinite" restart="never" nodeType="tmRoot"/>
-      </p:par>
-    </p:tnLst>
-  </p:timing>
 </p:sld>
 </file>
 
@@ -2840,7 +2833,7 @@
           <a:lstStyle/>
           <a:p>
             <a:r>
-              <a:rPr lang="en-GB" altLang="en-US" smtClean="0"/>
+              <a:rPr lang="en-GB" altLang="en-US"/>
               <a:t>What can you do with python?</a:t>
             </a:r>
           </a:p>
@@ -2861,7 +2854,7 @@
           <a:bodyPr/>
           <a:lstStyle/>
           <a:p>
-            <a:endParaRPr lang="en-GB" altLang="en-US" smtClean="0"/>
+            <a:endParaRPr lang="en-GB" altLang="en-US"/>
           </a:p>
         </p:txBody>
       </p:sp>
@@ -3000,13 +2993,6 @@
   <p:clrMapOvr>
     <a:masterClrMapping/>
   </p:clrMapOvr>
-  <p:timing>
-    <p:tnLst>
-      <p:par>
-        <p:cTn id="1" dur="indefinite" restart="never" nodeType="tmRoot"/>
-      </p:par>
-    </p:tnLst>
-  </p:timing>
 </p:sld>
 </file>
 
@@ -3048,7 +3034,7 @@
           <a:lstStyle/>
           <a:p>
             <a:r>
-              <a:rPr lang="en-GB" altLang="en-US" smtClean="0"/>
+              <a:rPr lang="en-GB" altLang="en-US"/>
               <a:t>What can you do with python?</a:t>
             </a:r>
           </a:p>
@@ -3140,13 +3126,6 @@
   <p:clrMapOvr>
     <a:masterClrMapping/>
   </p:clrMapOvr>
-  <p:timing>
-    <p:tnLst>
-      <p:par>
-        <p:cTn id="1" dur="indefinite" restart="never" nodeType="tmRoot"/>
-      </p:par>
-    </p:tnLst>
-  </p:timing>
 </p:sld>
 </file>
 
@@ -3183,7 +3162,7 @@
           <a:lstStyle/>
           <a:p>
             <a:r>
-              <a:rPr lang="en-GB" altLang="en-US" smtClean="0"/>
+              <a:rPr lang="en-GB" altLang="en-US"/>
               <a:t>What can you do with python?</a:t>
             </a:r>
           </a:p>
@@ -3304,13 +3283,6 @@
   <p:clrMapOvr>
     <a:masterClrMapping/>
   </p:clrMapOvr>
-  <p:timing>
-    <p:tnLst>
-      <p:par>
-        <p:cTn id="1" dur="indefinite" restart="never" nodeType="tmRoot"/>
-      </p:par>
-    </p:tnLst>
-  </p:timing>
 </p:sld>
 </file>
 
@@ -3347,7 +3319,7 @@
           <a:lstStyle/>
           <a:p>
             <a:r>
-              <a:rPr lang="en-GB" altLang="en-US" smtClean="0"/>
+              <a:rPr lang="en-GB" altLang="en-US"/>
               <a:t>Let's get to work...</a:t>
             </a:r>
           </a:p>
@@ -3368,7 +3340,7 @@
           <a:bodyPr/>
           <a:lstStyle/>
           <a:p>
-            <a:endParaRPr lang="en-GB" altLang="en-US" smtClean="0"/>
+            <a:endParaRPr lang="en-GB" altLang="en-US"/>
           </a:p>
         </p:txBody>
       </p:sp>
@@ -3377,13 +3349,6 @@
   <p:clrMapOvr>
     <a:masterClrMapping/>
   </p:clrMapOvr>
-  <p:timing>
-    <p:tnLst>
-      <p:par>
-        <p:cTn id="1" dur="indefinite" restart="never" nodeType="tmRoot"/>
-      </p:par>
-    </p:tnLst>
-  </p:timing>
 </p:sld>
 </file>
 
@@ -3420,7 +3385,7 @@
           <a:lstStyle/>
           <a:p>
             <a:r>
-              <a:rPr lang="en-GB" altLang="en-US" b="1" smtClean="0"/>
+              <a:rPr lang="en-GB" altLang="en-US" b="1"/>
               <a:t>BEFORE WE START (1)</a:t>
             </a:r>
           </a:p>
@@ -3446,14 +3411,9 @@
               <a:buNone/>
             </a:pPr>
             <a:r>
-              <a:rPr lang="en-GB" altLang="en-US" smtClean="0"/>
-              <a:t>We cannot teach you Python in a </a:t>
-            </a:r>
-            <a:r>
-              <a:rPr lang="en-GB" altLang="en-US" smtClean="0"/>
-              <a:t>day or two...</a:t>
-            </a:r>
-            <a:endParaRPr lang="en-GB" altLang="en-US" smtClean="0"/>
+              <a:rPr lang="en-GB" altLang="en-US"/>
+              <a:t>We cannot teach you Python in a day or two...</a:t>
+            </a:r>
           </a:p>
           <a:p>
             <a:pPr>
@@ -3461,16 +3421,8 @@
               <a:buNone/>
             </a:pPr>
             <a:r>
-              <a:rPr lang="en-GB" altLang="en-US" dirty="0" smtClean="0"/>
-              <a:t>...but hopefully we can show you that </a:t>
-            </a:r>
-            <a:r>
-              <a:rPr lang="en-GB" altLang="en-US" dirty="0" smtClean="0"/>
-              <a:t>it </a:t>
-            </a:r>
-            <a:r>
-              <a:rPr lang="en-GB" altLang="en-US" dirty="0" smtClean="0"/>
-              <a:t>is:</a:t>
+              <a:rPr lang="en-GB" altLang="en-US" dirty="0"/>
+              <a:t>...but hopefully we can show you that it is:</a:t>
             </a:r>
           </a:p>
           <a:p>
@@ -3478,23 +3430,23 @@
               <a:buFont typeface="Arial" panose="020B0604020202020204" pitchFamily="34" charset="0"/>
               <a:buNone/>
             </a:pPr>
-            <a:endParaRPr lang="en-GB" altLang="en-US" dirty="0" smtClean="0"/>
-          </a:p>
-          <a:p>
-            <a:r>
-              <a:rPr lang="en-GB" altLang="en-US" dirty="0" smtClean="0"/>
+            <a:endParaRPr lang="en-GB" altLang="en-US" dirty="0"/>
+          </a:p>
+          <a:p>
+            <a:r>
+              <a:rPr lang="en-GB" altLang="en-US" dirty="0"/>
               <a:t>Human-readable (relatively)</a:t>
             </a:r>
           </a:p>
           <a:p>
             <a:r>
-              <a:rPr lang="en-GB" altLang="en-US" dirty="0" smtClean="0"/>
+              <a:rPr lang="en-GB" altLang="en-US" dirty="0"/>
               <a:t>Useful (even if you only know a bit)</a:t>
             </a:r>
           </a:p>
           <a:p>
             <a:r>
-              <a:rPr lang="en-GB" altLang="en-US" dirty="0" smtClean="0"/>
+              <a:rPr lang="en-GB" altLang="en-US" dirty="0"/>
               <a:t>Flexible (you can use it in many places/ways)</a:t>
             </a:r>
           </a:p>
@@ -3718,7 +3670,7 @@
           <a:lstStyle/>
           <a:p>
             <a:r>
-              <a:rPr lang="en-GB" altLang="en-US" b="1" smtClean="0"/>
+              <a:rPr lang="en-GB" altLang="en-US" b="1"/>
               <a:t>BEFORE WE START (2)</a:t>
             </a:r>
           </a:p>
@@ -3744,7 +3696,7 @@
               <a:buNone/>
             </a:pPr>
             <a:r>
-              <a:rPr lang="en-GB" altLang="en-US" smtClean="0"/>
+              <a:rPr lang="en-GB" altLang="en-US"/>
               <a:t>Teaching materials courtesy of:</a:t>
             </a:r>
           </a:p>
@@ -3753,7 +3705,7 @@
               <a:buFont typeface="Arial" panose="020B0604020202020204" pitchFamily="34" charset="0"/>
               <a:buNone/>
             </a:pPr>
-            <a:endParaRPr lang="en-GB" altLang="en-US" smtClean="0"/>
+            <a:endParaRPr lang="en-GB" altLang="en-US"/>
           </a:p>
           <a:p>
             <a:pPr algn="ctr">
@@ -3761,44 +3713,44 @@
               <a:buNone/>
             </a:pPr>
             <a:r>
-              <a:rPr lang="en-GB" altLang="en-US" smtClean="0"/>
+              <a:rPr lang="en-GB" altLang="en-US"/>
               <a:t> </a:t>
             </a:r>
             <a:r>
-              <a:rPr lang="en-GB" altLang="en-US" smtClean="0">
+              <a:rPr lang="en-GB" altLang="en-US">
                 <a:hlinkClick r:id="rId2"/>
               </a:rPr>
               <a:t>http://www.software-carpentry.org/</a:t>
             </a:r>
-            <a:endParaRPr lang="en-GB" altLang="en-US" smtClean="0"/>
+            <a:endParaRPr lang="en-GB" altLang="en-US"/>
           </a:p>
           <a:p>
             <a:pPr>
               <a:buFont typeface="Arial" panose="020B0604020202020204" pitchFamily="34" charset="0"/>
               <a:buNone/>
             </a:pPr>
-            <a:endParaRPr lang="en-GB" altLang="en-US" smtClean="0"/>
+            <a:endParaRPr lang="en-GB" altLang="en-US"/>
           </a:p>
           <a:p>
             <a:pPr>
               <a:buFont typeface="Arial" panose="020B0604020202020204" pitchFamily="34" charset="0"/>
               <a:buNone/>
             </a:pPr>
-            <a:endParaRPr lang="en-GB" altLang="en-US" smtClean="0"/>
+            <a:endParaRPr lang="en-GB" altLang="en-US"/>
           </a:p>
           <a:p>
             <a:pPr>
               <a:buFont typeface="Arial" panose="020B0604020202020204" pitchFamily="34" charset="0"/>
               <a:buNone/>
             </a:pPr>
-            <a:endParaRPr lang="en-GB" altLang="en-US" smtClean="0"/>
+            <a:endParaRPr lang="en-GB" altLang="en-US"/>
           </a:p>
           <a:p>
             <a:pPr>
               <a:buFont typeface="Arial" panose="020B0604020202020204" pitchFamily="34" charset="0"/>
               <a:buNone/>
             </a:pPr>
-            <a:endParaRPr lang="en-GB" altLang="en-US" sz="1800" smtClean="0"/>
+            <a:endParaRPr lang="en-GB" altLang="en-US" sz="1800"/>
           </a:p>
         </p:txBody>
       </p:sp>
@@ -3846,13 +3798,6 @@
   <p:clrMapOvr>
     <a:masterClrMapping/>
   </p:clrMapOvr>
-  <p:timing>
-    <p:tnLst>
-      <p:par>
-        <p:cTn id="1" dur="indefinite" restart="never" nodeType="tmRoot"/>
-      </p:par>
-    </p:tnLst>
-  </p:timing>
 </p:sld>
 </file>
 
@@ -3889,7 +3834,7 @@
           <a:lstStyle/>
           <a:p>
             <a:r>
-              <a:rPr lang="en-GB" altLang="en-US" smtClean="0"/>
+              <a:rPr lang="en-GB" altLang="en-US"/>
               <a:t>Overview</a:t>
             </a:r>
           </a:p>
@@ -3916,49 +3861,49 @@
           <a:lstStyle/>
           <a:p>
             <a:r>
-              <a:rPr lang="en-GB" altLang="en-US" smtClean="0"/>
+              <a:rPr lang="en-GB" altLang="en-US"/>
               <a:t>Introduction – why we recommend Python</a:t>
             </a:r>
           </a:p>
           <a:p>
             <a:r>
-              <a:rPr lang="en-GB" altLang="en-US" smtClean="0"/>
+              <a:rPr lang="en-GB" altLang="en-US"/>
               <a:t>Basics and control flow</a:t>
             </a:r>
           </a:p>
           <a:p>
             <a:r>
-              <a:rPr lang="en-GB" altLang="en-US" smtClean="0"/>
+              <a:rPr lang="en-GB" altLang="en-US"/>
               <a:t>Lists, tuples and slicing</a:t>
             </a:r>
           </a:p>
           <a:p>
             <a:r>
-              <a:rPr lang="en-GB" altLang="en-US" smtClean="0"/>
+              <a:rPr lang="en-GB" altLang="en-US"/>
               <a:t>Input/output</a:t>
             </a:r>
           </a:p>
           <a:p>
             <a:r>
-              <a:rPr lang="en-GB" altLang="en-US" smtClean="0"/>
+              <a:rPr lang="en-GB" altLang="en-US"/>
               <a:t>Strings and text processing</a:t>
             </a:r>
           </a:p>
           <a:p>
             <a:r>
-              <a:rPr lang="en-GB" altLang="en-US" smtClean="0"/>
+              <a:rPr lang="en-GB" altLang="en-US"/>
               <a:t>Functions, libraries and scripts</a:t>
             </a:r>
           </a:p>
           <a:p>
             <a:r>
-              <a:rPr lang="en-GB" altLang="en-US" smtClean="0"/>
+              <a:rPr lang="en-GB" altLang="en-US"/>
               <a:t>Error handling and logging</a:t>
             </a:r>
           </a:p>
           <a:p>
             <a:r>
-              <a:rPr lang="en-GB" altLang="en-US" smtClean="0"/>
+              <a:rPr lang="en-GB" altLang="en-US"/>
               <a:t>Sets, dictionaries and OOP</a:t>
             </a:r>
           </a:p>
@@ -3969,13 +3914,6 @@
   <p:clrMapOvr>
     <a:masterClrMapping/>
   </p:clrMapOvr>
-  <p:timing>
-    <p:tnLst>
-      <p:par>
-        <p:cTn id="1" dur="indefinite" restart="never" nodeType="tmRoot"/>
-      </p:par>
-    </p:tnLst>
-  </p:timing>
 </p:sld>
 </file>
 
@@ -4012,7 +3950,7 @@
           <a:lstStyle/>
           <a:p>
             <a:r>
-              <a:rPr lang="en-GB" altLang="en-US" smtClean="0"/>
+              <a:rPr lang="en-GB" altLang="en-US"/>
               <a:t>What is Python?</a:t>
             </a:r>
           </a:p>
@@ -4034,19 +3972,19 @@
           <a:lstStyle/>
           <a:p>
             <a:r>
-              <a:rPr lang="en-GB" altLang="en-US" smtClean="0"/>
+              <a:rPr lang="en-GB" altLang="en-US"/>
               <a:t>A simple interpreted language</a:t>
             </a:r>
           </a:p>
           <a:p>
             <a:r>
-              <a:rPr lang="en-GB" altLang="en-US" smtClean="0"/>
+              <a:rPr lang="en-GB" altLang="en-US"/>
               <a:t>Very human-readable with clean syntax</a:t>
             </a:r>
           </a:p>
           <a:p>
             <a:r>
-              <a:rPr lang="en-GB" altLang="en-US" smtClean="0"/>
+              <a:rPr lang="en-GB" altLang="en-US"/>
               <a:t>Making it a very good "learn to programme" language</a:t>
             </a:r>
           </a:p>
@@ -4057,13 +3995,6 @@
   <p:clrMapOvr>
     <a:masterClrMapping/>
   </p:clrMapOvr>
-  <p:timing>
-    <p:tnLst>
-      <p:par>
-        <p:cTn id="1" dur="indefinite" restart="never" nodeType="tmRoot"/>
-      </p:par>
-    </p:tnLst>
-  </p:timing>
 </p:sld>
 </file>
 
@@ -4100,7 +4031,7 @@
           <a:lstStyle/>
           <a:p>
             <a:r>
-              <a:rPr lang="en-GB" altLang="en-US" sz="4000" smtClean="0"/>
+              <a:rPr lang="en-GB" altLang="en-US" sz="4000"/>
               <a:t>Why do we recommend Python?</a:t>
             </a:r>
           </a:p>
@@ -4127,66 +4058,66 @@
           <a:lstStyle/>
           <a:p>
             <a:r>
-              <a:rPr lang="en-GB" altLang="en-US" smtClean="0"/>
+              <a:rPr lang="en-GB" altLang="en-US"/>
               <a:t>It is </a:t>
             </a:r>
             <a:r>
-              <a:rPr lang="en-GB" altLang="en-US" b="1" smtClean="0"/>
+              <a:rPr lang="en-GB" altLang="en-US" b="1"/>
               <a:t>open source </a:t>
             </a:r>
             <a:r>
-              <a:rPr lang="en-GB" altLang="en-US" smtClean="0"/>
+              <a:rPr lang="en-GB" altLang="en-US"/>
               <a:t>and </a:t>
             </a:r>
             <a:r>
-              <a:rPr lang="en-GB" altLang="en-US" b="1" smtClean="0"/>
+              <a:rPr lang="en-GB" altLang="en-US" b="1"/>
               <a:t>free</a:t>
             </a:r>
           </a:p>
           <a:p>
             <a:r>
-              <a:rPr lang="en-GB" altLang="en-US" smtClean="0"/>
+              <a:rPr lang="en-GB" altLang="en-US"/>
               <a:t>It is </a:t>
             </a:r>
             <a:r>
-              <a:rPr lang="en-GB" altLang="en-US" b="1" smtClean="0"/>
+              <a:rPr lang="en-GB" altLang="en-US" b="1"/>
               <a:t>cross-platform</a:t>
             </a:r>
             <a:r>
-              <a:rPr lang="en-GB" altLang="en-US" smtClean="0"/>
+              <a:rPr lang="en-GB" altLang="en-US"/>
               <a:t> (including Windows)</a:t>
             </a:r>
           </a:p>
           <a:p>
             <a:r>
-              <a:rPr lang="en-GB" altLang="en-US" smtClean="0"/>
+              <a:rPr lang="en-GB" altLang="en-US"/>
               <a:t>It can be used for simple scripting through to writing full-blown complex applications</a:t>
             </a:r>
           </a:p>
           <a:p>
             <a:r>
-              <a:rPr lang="en-GB" altLang="en-US" smtClean="0"/>
+              <a:rPr lang="en-GB" altLang="en-US"/>
               <a:t>Many libraries/tools to tackle all kinds of problems</a:t>
             </a:r>
           </a:p>
           <a:p>
             <a:r>
-              <a:rPr lang="en-GB" altLang="en-US" smtClean="0"/>
+              <a:rPr lang="en-GB" altLang="en-US"/>
               <a:t>In the environmental science community it continues to grow in popularity...so </a:t>
             </a:r>
             <a:r>
-              <a:rPr lang="en-GB" altLang="en-US" b="1" smtClean="0"/>
+              <a:rPr lang="en-GB" altLang="en-US" b="1"/>
               <a:t>we can share code</a:t>
             </a:r>
             <a:r>
-              <a:rPr lang="en-GB" altLang="en-US" smtClean="0"/>
+              <a:rPr lang="en-GB" altLang="en-US"/>
               <a:t>!</a:t>
             </a:r>
-            <a:endParaRPr lang="en-GB" altLang="en-US" sz="3600" smtClean="0"/>
+            <a:endParaRPr lang="en-GB" altLang="en-US" sz="3600"/>
           </a:p>
           <a:p>
             <a:pPr lvl="1"/>
-            <a:endParaRPr lang="en-GB" altLang="en-US" smtClean="0"/>
+            <a:endParaRPr lang="en-GB" altLang="en-US"/>
           </a:p>
         </p:txBody>
       </p:sp>
@@ -4195,13 +4126,6 @@
   <p:clrMapOvr>
     <a:masterClrMapping/>
   </p:clrMapOvr>
-  <p:timing>
-    <p:tnLst>
-      <p:par>
-        <p:cTn id="1" dur="indefinite" restart="never" nodeType="tmRoot"/>
-      </p:par>
-    </p:tnLst>
-  </p:timing>
 </p:sld>
 </file>
 
@@ -4243,7 +4167,7 @@
           <a:lstStyle/>
           <a:p>
             <a:r>
-              <a:rPr lang="en-GB" altLang="en-US" smtClean="0"/>
+              <a:rPr lang="en-GB" altLang="en-US"/>
               <a:t>Python version?</a:t>
             </a:r>
           </a:p>
@@ -4262,7 +4186,7 @@
         <p:spPr>
           <a:xfrm>
             <a:off x="457200" y="1160463"/>
-            <a:ext cx="8229600" cy="3844925"/>
+            <a:ext cx="8229600" cy="540345"/>
           </a:xfrm>
         </p:spPr>
         <p:txBody>
@@ -4274,313 +4198,87 @@
               <a:buNone/>
             </a:pPr>
             <a:r>
-              <a:rPr lang="en-GB" altLang="en-US" smtClean="0"/>
-              <a:t>Python has multiple personalities!</a:t>
-            </a:r>
-          </a:p>
-          <a:p>
-            <a:pPr>
-              <a:buFont typeface="Arial" panose="020B0604020202020204" pitchFamily="34" charset="0"/>
-              <a:buNone/>
-            </a:pPr>
-            <a:endParaRPr lang="en-GB" altLang="en-US" sz="1200" smtClean="0"/>
-          </a:p>
-          <a:p>
-            <a:r>
-              <a:rPr lang="en-GB" altLang="en-US" b="1" smtClean="0">
-                <a:solidFill>
-                  <a:srgbClr val="0070C0"/>
-                </a:solidFill>
-              </a:rPr>
-              <a:t>Python 3</a:t>
-            </a:r>
-            <a:r>
-              <a:rPr lang="en-GB" altLang="en-US" smtClean="0"/>
-              <a:t> – new; standard; </a:t>
-            </a:r>
+              <a:rPr lang="en-GB" altLang="en-US" dirty="0"/>
+              <a:t>Ideally should be using Python 3.8+</a:t>
+            </a:r>
+            <a:endParaRPr lang="en-GB" altLang="en-US" sz="3200" b="1" i="1" dirty="0"/>
           </a:p>
           <a:p>
             <a:pPr lvl="1">
               <a:buFont typeface="Arial" panose="020B0604020202020204" pitchFamily="34" charset="0"/>
               <a:buNone/>
             </a:pPr>
-            <a:r>
-              <a:rPr lang="en-GB" altLang="en-US" sz="3200" b="1" i="1" smtClean="0"/>
-              <a:t>Most people updating old code to standard.</a:t>
-            </a:r>
-          </a:p>
-          <a:p>
-            <a:pPr lvl="1">
-              <a:buFont typeface="Arial" panose="020B0604020202020204" pitchFamily="34" charset="0"/>
-              <a:buNone/>
-            </a:pPr>
-            <a:r>
-              <a:rPr lang="en-GB" altLang="en-US" sz="3200" b="1" i="1" smtClean="0"/>
-              <a:t>Used in this course!</a:t>
-            </a:r>
-          </a:p>
-          <a:p>
-            <a:r>
-              <a:rPr lang="en-GB" altLang="en-US" b="1" smtClean="0">
-                <a:solidFill>
-                  <a:srgbClr val="0070C0"/>
-                </a:solidFill>
-              </a:rPr>
-              <a:t>Python 2.6+</a:t>
-            </a:r>
-            <a:r>
-              <a:rPr lang="en-GB" altLang="en-US" smtClean="0"/>
-              <a:t> – old; established; </a:t>
-            </a:r>
-          </a:p>
-          <a:p>
-            <a:pPr lvl="1">
-              <a:buFont typeface="Arial" panose="020B0604020202020204" pitchFamily="34" charset="0"/>
-              <a:buNone/>
-            </a:pPr>
-            <a:r>
-              <a:rPr lang="en-GB" altLang="en-US" sz="3200" b="1" i="1" smtClean="0"/>
-              <a:t>Nearing end of life.</a:t>
-            </a:r>
-          </a:p>
-          <a:p>
-            <a:pPr lvl="1">
-              <a:buFont typeface="Arial" panose="020B0604020202020204" pitchFamily="34" charset="0"/>
-              <a:buNone/>
-            </a:pPr>
-            <a:endParaRPr lang="en-GB" altLang="en-US" b="1" i="1" smtClean="0"/>
+            <a:endParaRPr lang="en-GB" altLang="en-US" b="1" i="1" dirty="0"/>
           </a:p>
         </p:txBody>
       </p:sp>
       <p:pic>
         <p:nvPicPr>
-          <p:cNvPr id="31746" name="Picture 2" descr="python™"/>
+          <p:cNvPr id="2" name="Picture 1">
+            <a:extLst>
+              <a:ext uri="{FF2B5EF4-FFF2-40B4-BE49-F238E27FC236}">
+                <a16:creationId xmlns:a16="http://schemas.microsoft.com/office/drawing/2014/main" id="{955508CA-201E-CC4C-984D-280BC6EA93C7}"/>
+              </a:ext>
+            </a:extLst>
+          </p:cNvPr>
           <p:cNvPicPr>
-            <a:picLocks noChangeAspect="1" noChangeArrowheads="1"/>
+            <a:picLocks noChangeAspect="1"/>
           </p:cNvPicPr>
           <p:nvPr/>
         </p:nvPicPr>
         <p:blipFill>
           <a:blip r:embed="rId2"/>
-          <a:srcRect/>
           <a:stretch>
             <a:fillRect/>
           </a:stretch>
         </p:blipFill>
-        <p:spPr bwMode="auto">
+        <p:spPr>
           <a:xfrm>
-            <a:off x="539750" y="5006975"/>
-            <a:ext cx="2762250" cy="781050"/>
+            <a:off x="3434044" y="1763807"/>
+            <a:ext cx="5361860" cy="4365104"/>
           </a:xfrm>
           <a:prstGeom prst="rect">
             <a:avLst/>
           </a:prstGeom>
         </p:spPr>
-        <p:style>
-          <a:lnRef idx="0">
-            <a:schemeClr val="accent1"/>
-          </a:lnRef>
-          <a:fillRef idx="3">
-            <a:schemeClr val="accent1"/>
-          </a:fillRef>
-          <a:effectRef idx="3">
-            <a:schemeClr val="accent1"/>
-          </a:effectRef>
-          <a:fontRef idx="minor">
-            <a:schemeClr val="lt1"/>
-          </a:fontRef>
-        </p:style>
       </p:pic>
       <p:sp>
         <p:nvSpPr>
-          <p:cNvPr id="5" name="TextBox 4"/>
-          <p:cNvSpPr txBox="1"/>
+          <p:cNvPr id="4" name="Rectangle 3">
+            <a:extLst>
+              <a:ext uri="{FF2B5EF4-FFF2-40B4-BE49-F238E27FC236}">
+                <a16:creationId xmlns:a16="http://schemas.microsoft.com/office/drawing/2014/main" id="{228F1988-07E0-9540-B749-CE76BD3BF3A8}"/>
+              </a:ext>
+            </a:extLst>
+          </p:cNvPr>
+          <p:cNvSpPr/>
           <p:nvPr/>
         </p:nvSpPr>
         <p:spPr>
           <a:xfrm>
-            <a:off x="5338763" y="2924175"/>
-            <a:ext cx="3697287" cy="2863850"/>
+            <a:off x="328525" y="3429000"/>
+            <a:ext cx="3082895" cy="369332"/>
           </a:xfrm>
           <a:prstGeom prst="rect">
             <a:avLst/>
           </a:prstGeom>
         </p:spPr>
-        <p:style>
-          <a:lnRef idx="0">
-            <a:schemeClr val="accent1"/>
-          </a:lnRef>
-          <a:fillRef idx="3">
-            <a:schemeClr val="accent1"/>
-          </a:fillRef>
-          <a:effectRef idx="3">
-            <a:schemeClr val="accent1"/>
-          </a:effectRef>
-          <a:fontRef idx="minor">
-            <a:schemeClr val="lt1"/>
-          </a:fontRef>
-        </p:style>
-        <p:txBody>
-          <a:bodyPr>
+        <p:txBody>
+          <a:bodyPr wrap="none">
             <a:spAutoFit/>
           </a:bodyPr>
           <a:lstStyle/>
           <a:p>
-            <a:pPr algn="ctr" eaLnBrk="1" fontAlgn="auto" hangingPunct="1">
-              <a:spcBef>
-                <a:spcPts val="0"/>
-              </a:spcBef>
-              <a:spcAft>
-                <a:spcPts val="0"/>
-              </a:spcAft>
-              <a:defRPr/>
-            </a:pPr>
-            <a:r>
-              <a:rPr lang="en-GB" sz="2000" b="1" dirty="0">
-                <a:solidFill>
-                  <a:schemeClr val="tx1"/>
-                </a:solidFill>
+            <a:r>
+              <a:rPr lang="en-GB" dirty="0">
+                <a:hlinkClick r:id="rId3"/>
               </a:rPr>
-              <a:t>But what changed?</a:t>
-            </a:r>
-          </a:p>
-          <a:p>
-            <a:pPr algn="ctr" eaLnBrk="1" fontAlgn="auto" hangingPunct="1">
-              <a:spcBef>
-                <a:spcPts val="0"/>
-              </a:spcBef>
-              <a:spcAft>
-                <a:spcPts val="0"/>
-              </a:spcAft>
-              <a:defRPr/>
-            </a:pPr>
-            <a:endParaRPr lang="en-GB" sz="2000" b="1" dirty="0">
-              <a:solidFill>
-                <a:schemeClr val="tx2">
-                  <a:lumMod val="75000"/>
-                </a:schemeClr>
-              </a:solidFill>
-            </a:endParaRPr>
-          </a:p>
-          <a:p>
-            <a:pPr eaLnBrk="1" fontAlgn="auto" hangingPunct="1">
-              <a:spcBef>
-                <a:spcPts val="0"/>
-              </a:spcBef>
-              <a:spcAft>
-                <a:spcPts val="0"/>
-              </a:spcAft>
-              <a:defRPr/>
-            </a:pPr>
-            <a:r>
-              <a:rPr lang="en-GB" sz="2000" b="1" dirty="0">
-                <a:solidFill>
-                  <a:schemeClr val="bg1"/>
-                </a:solidFill>
-              </a:rPr>
-              <a:t>E.g. print</a:t>
-            </a:r>
-            <a:r>
-              <a:rPr lang="en-GB" sz="2000" dirty="0">
-                <a:solidFill>
-                  <a:schemeClr val="bg1"/>
-                </a:solidFill>
-              </a:rPr>
-              <a:t> changed from a statement to a function...</a:t>
-            </a:r>
-          </a:p>
-          <a:p>
-            <a:pPr eaLnBrk="1" fontAlgn="auto" hangingPunct="1">
-              <a:spcBef>
-                <a:spcPts val="0"/>
-              </a:spcBef>
-              <a:spcAft>
-                <a:spcPts val="0"/>
-              </a:spcAft>
-              <a:defRPr/>
-            </a:pPr>
-            <a:endParaRPr lang="en-GB" sz="2000" dirty="0">
-              <a:solidFill>
-                <a:schemeClr val="bg1"/>
-              </a:solidFill>
-            </a:endParaRPr>
-          </a:p>
-          <a:p>
-            <a:pPr eaLnBrk="1" fontAlgn="auto" hangingPunct="1">
-              <a:spcBef>
-                <a:spcPts val="0"/>
-              </a:spcBef>
-              <a:spcAft>
-                <a:spcPts val="0"/>
-              </a:spcAft>
-              <a:defRPr/>
-            </a:pPr>
-            <a:r>
-              <a:rPr lang="en-GB" sz="2000" dirty="0">
-                <a:solidFill>
-                  <a:schemeClr val="bg1"/>
-                </a:solidFill>
-              </a:rPr>
-              <a:t>&gt;&gt;&gt;</a:t>
-            </a:r>
-            <a:r>
-              <a:rPr lang="en-GB" sz="2000" b="1" dirty="0">
-                <a:solidFill>
-                  <a:schemeClr val="bg1"/>
-                </a:solidFill>
-              </a:rPr>
-              <a:t> print "hello" </a:t>
-            </a:r>
-            <a:r>
-              <a:rPr lang="en-GB" sz="2000" dirty="0">
-                <a:solidFill>
-                  <a:schemeClr val="bg1"/>
-                </a:solidFill>
-              </a:rPr>
-              <a:t># in Python 2.* to...</a:t>
-            </a:r>
-          </a:p>
-          <a:p>
-            <a:pPr eaLnBrk="1" fontAlgn="auto" hangingPunct="1">
-              <a:spcBef>
-                <a:spcPts val="0"/>
-              </a:spcBef>
-              <a:spcAft>
-                <a:spcPts val="0"/>
-              </a:spcAft>
-              <a:defRPr/>
-            </a:pPr>
-            <a:r>
-              <a:rPr lang="en-GB" sz="2000" dirty="0">
-                <a:solidFill>
-                  <a:schemeClr val="bg1"/>
-                </a:solidFill>
-              </a:rPr>
-              <a:t>&gt;&gt;&gt;</a:t>
-            </a:r>
-            <a:r>
-              <a:rPr lang="en-GB" sz="2000" b="1" dirty="0">
-                <a:solidFill>
-                  <a:schemeClr val="bg1"/>
-                </a:solidFill>
-              </a:rPr>
-              <a:t> print ("hello") </a:t>
-            </a:r>
-            <a:r>
-              <a:rPr lang="en-GB" sz="2000" dirty="0">
-                <a:solidFill>
-                  <a:schemeClr val="bg1"/>
-                </a:solidFill>
-              </a:rPr>
-              <a:t># in Python 3.*</a:t>
-            </a:r>
-            <a:endParaRPr lang="en-GB" sz="2000" b="1" dirty="0">
-              <a:solidFill>
-                <a:schemeClr val="tx2">
-                  <a:lumMod val="75000"/>
-                </a:schemeClr>
-              </a:solidFill>
-            </a:endParaRPr>
+              <a:t>https://endoflife.date/python</a:t>
+            </a:r>
+            <a:r>
+              <a:rPr lang="en-GB" dirty="0"/>
+              <a:t> </a:t>
+            </a:r>
           </a:p>
         </p:txBody>
       </p:sp>
@@ -4601,6 +4299,9 @@
                     <p:cTn id="3" fill="hold" nodeType="clickPar">
                       <p:stCondLst>
                         <p:cond delay="indefinite"/>
+                        <p:cond evt="onBegin" delay="0">
+                          <p:tn val="2"/>
+                        </p:cond>
                       </p:stCondLst>
                       <p:childTnLst>
                         <p:par>
@@ -4610,7 +4311,7 @@
                             </p:stCondLst>
                             <p:childTnLst>
                               <p:par>
-                                <p:cTn id="5" presetID="1" presetClass="entr" presetSubtype="0" fill="hold" nodeType="clickEffect">
+                                <p:cTn id="5" presetID="1" presetClass="entr" presetSubtype="0" fill="hold" nodeType="withEffect">
                                   <p:stCondLst>
                                     <p:cond delay="0"/>
                                   </p:stCondLst>
@@ -4625,7 +4326,7 @@
                                         <p:tgtEl>
                                           <p:spTgt spid="3">
                                             <p:txEl>
-                                              <p:pRg st="5" end="5"/>
+                                              <p:pRg st="0" end="0"/>
                                             </p:txEl>
                                           </p:spTgt>
                                         </p:tgtEl>
@@ -4637,128 +4338,6 @@
                                         <p:strVal val="visible"/>
                                       </p:to>
                                     </p:set>
-                                  </p:childTnLst>
-                                </p:cTn>
-                              </p:par>
-                              <p:par>
-                                <p:cTn id="7" presetID="1" presetClass="entr" presetSubtype="0" fill="hold" nodeType="withEffect">
-                                  <p:stCondLst>
-                                    <p:cond delay="0"/>
-                                  </p:stCondLst>
-                                  <p:childTnLst>
-                                    <p:set>
-                                      <p:cBhvr>
-                                        <p:cTn id="8" dur="1" fill="hold">
-                                          <p:stCondLst>
-                                            <p:cond delay="0"/>
-                                          </p:stCondLst>
-                                        </p:cTn>
-                                        <p:tgtEl>
-                                          <p:spTgt spid="3">
-                                            <p:txEl>
-                                              <p:pRg st="6" end="6"/>
-                                            </p:txEl>
-                                          </p:spTgt>
-                                        </p:tgtEl>
-                                        <p:attrNameLst>
-                                          <p:attrName>style.visibility</p:attrName>
-                                        </p:attrNameLst>
-                                      </p:cBhvr>
-                                      <p:to>
-                                        <p:strVal val="visible"/>
-                                      </p:to>
-                                    </p:set>
-                                  </p:childTnLst>
-                                </p:cTn>
-                              </p:par>
-                            </p:childTnLst>
-                          </p:cTn>
-                        </p:par>
-                      </p:childTnLst>
-                    </p:cTn>
-                  </p:par>
-                  <p:par>
-                    <p:cTn id="9" fill="hold" nodeType="clickPar">
-                      <p:stCondLst>
-                        <p:cond delay="indefinite"/>
-                      </p:stCondLst>
-                      <p:childTnLst>
-                        <p:par>
-                          <p:cTn id="10" fill="hold" nodeType="withGroup">
-                            <p:stCondLst>
-                              <p:cond delay="0"/>
-                            </p:stCondLst>
-                            <p:childTnLst>
-                              <p:par>
-                                <p:cTn id="11" presetID="2" presetClass="entr" presetSubtype="4" fill="hold" nodeType="clickEffect">
-                                  <p:stCondLst>
-                                    <p:cond delay="0"/>
-                                  </p:stCondLst>
-                                  <p:childTnLst>
-                                    <p:set>
-                                      <p:cBhvr>
-                                        <p:cTn id="12" dur="1" fill="hold">
-                                          <p:stCondLst>
-                                            <p:cond delay="0"/>
-                                          </p:stCondLst>
-                                        </p:cTn>
-                                        <p:tgtEl>
-                                          <p:spTgt spid="5"/>
-                                        </p:tgtEl>
-                                        <p:attrNameLst>
-                                          <p:attrName>style.visibility</p:attrName>
-                                        </p:attrNameLst>
-                                      </p:cBhvr>
-                                      <p:to>
-                                        <p:strVal val="visible"/>
-                                      </p:to>
-                                    </p:set>
-                                    <p:anim calcmode="lin" valueType="num">
-                                      <p:cBhvr additive="base">
-                                        <p:cTn id="13" dur="500" fill="hold"/>
-                                        <p:tgtEl>
-                                          <p:spTgt spid="5"/>
-                                        </p:tgtEl>
-                                        <p:attrNameLst>
-                                          <p:attrName>ppt_x</p:attrName>
-                                        </p:attrNameLst>
-                                      </p:cBhvr>
-                                      <p:tavLst>
-                                        <p:tav tm="0">
-                                          <p:val>
-                                            <p:strVal val="#ppt_x"/>
-                                          </p:val>
-                                        </p:tav>
-                                        <p:tav tm="100000">
-                                          <p:val>
-                                            <p:strVal val="#ppt_x"/>
-                                          </p:val>
-                                        </p:tav>
-                                      </p:tavLst>
-                                    </p:anim>
-                                    <p:anim calcmode="lin" valueType="num">
-                                      <p:cBhvr additive="base">
-                                        <p:cTn id="14" dur="500" fill="hold"/>
-                                        <p:tgtEl>
-                                          <p:spTgt spid="5"/>
-                                        </p:tgtEl>
-                                        <p:attrNameLst>
-                                          <p:attrName>ppt_y</p:attrName>
-                                        </p:attrNameLst>
-                                      </p:cBhvr>
-                                      <p:tavLst>
-                                        <p:tav tm="0">
-                                          <p:val>
-                                            <p:strVal val="1+#ppt_h/2"/>
-                                          </p:val>
-                                        </p:tav>
-                                        <p:tav tm="100000">
-                                          <p:val>
-                                            <p:strVal val="#ppt_y"/>
-                                          </p:val>
-                                        </p:tav>
-                                      </p:tavLst>
-                                    </p:anim>
                                   </p:childTnLst>
                                 </p:cTn>
                               </p:par>
@@ -4826,7 +4405,7 @@
           <a:lstStyle/>
           <a:p>
             <a:r>
-              <a:rPr lang="en-GB" altLang="en-US" sz="4000" smtClean="0"/>
+              <a:rPr lang="en-GB" altLang="en-US" sz="4000"/>
               <a:t>What can you do with python?</a:t>
             </a:r>
           </a:p>
@@ -5153,7 +4732,7 @@
           <a:lstStyle/>
           <a:p>
             <a:r>
-              <a:rPr lang="en-GB" altLang="en-US" smtClean="0"/>
+              <a:rPr lang="en-GB" altLang="en-US"/>
               <a:t>What can you do with python?</a:t>
             </a:r>
           </a:p>
@@ -5303,13 +4882,6 @@
   <p:clrMapOvr>
     <a:masterClrMapping/>
   </p:clrMapOvr>
-  <p:timing>
-    <p:tnLst>
-      <p:par>
-        <p:cTn id="1" dur="indefinite" restart="never" nodeType="tmRoot"/>
-      </p:par>
-    </p:tnLst>
-  </p:timing>
 </p:sld>
 </file>
 

</xml_diff>